<commit_message>
modify get_balance and transaction for miner
</commit_message>
<xml_diff>
--- a/HW1_final/requirement.pptx
+++ b/HW1_final/requirement.pptx
@@ -34,18 +34,11 @@
   <p:notesSz cx="6858000" cy="9144000"/>
   <p:embeddedFontLst>
     <p:embeddedFont>
-      <p:font typeface="Merriweather" pitchFamily="2" charset="0"/>
+      <p:font typeface="Roboto" panose="02000000000000000000" pitchFamily="2" charset="0"/>
       <p:regular r:id="rId24"/>
       <p:bold r:id="rId25"/>
       <p:italic r:id="rId26"/>
       <p:boldItalic r:id="rId27"/>
-    </p:embeddedFont>
-    <p:embeddedFont>
-      <p:font typeface="Roboto" panose="02000000000000000000" pitchFamily="2" charset="0"/>
-      <p:regular r:id="rId28"/>
-      <p:bold r:id="rId29"/>
-      <p:italic r:id="rId30"/>
-      <p:boldItalic r:id="rId31"/>
     </p:embeddedFont>
   </p:embeddedFontLst>
   <p:defaultTextStyle>
@@ -1260,7 +1253,7 @@
               </a:spcAft>
               <a:buNone/>
             </a:pPr>
-            <a:endParaRPr/>
+            <a:endParaRPr dirty="0"/>
           </a:p>
         </p:txBody>
       </p:sp>
@@ -1800,7 +1793,54 @@
               </a:spcAft>
               <a:buNone/>
             </a:pPr>
-            <a:endParaRPr/>
+            <a:r>
+              <a:rPr lang="zh-TW" altLang="en-US" dirty="0"/>
+              <a:t>每個</a:t>
+            </a:r>
+            <a:r>
+              <a:rPr lang="en-US" altLang="zh-TW" dirty="0"/>
+              <a:t>block</a:t>
+            </a:r>
+            <a:r>
+              <a:rPr lang="zh-TW" altLang="en-US" dirty="0"/>
+              <a:t>留一個位子給</a:t>
+            </a:r>
+            <a:r>
+              <a:rPr lang="en-US" altLang="zh-TW" dirty="0"/>
+              <a:t>miner</a:t>
+            </a:r>
+            <a:r>
+              <a:rPr lang="zh-TW" altLang="en-US" dirty="0"/>
+              <a:t>打包的獎勵</a:t>
+            </a:r>
+            <a:r>
+              <a:rPr lang="en-US" altLang="zh-TW" dirty="0"/>
+              <a:t>transaction</a:t>
+            </a:r>
+          </a:p>
+          <a:p>
+            <a:pPr marL="0" lvl="0" indent="0" algn="l" rtl="0">
+              <a:spcBef>
+                <a:spcPts val="0"/>
+              </a:spcBef>
+              <a:spcAft>
+                <a:spcPts val="0"/>
+              </a:spcAft>
+              <a:buNone/>
+            </a:pPr>
+            <a:r>
+              <a:rPr lang="en-US" dirty="0"/>
+              <a:t>Miner</a:t>
+            </a:r>
+            <a:r>
+              <a:rPr lang="zh-TW" altLang="en-US" dirty="0"/>
+              <a:t>交易時沒有</a:t>
+            </a:r>
+            <a:r>
+              <a:rPr lang="zh-TW" altLang="en-US"/>
+              <a:t>任何驗證</a:t>
+            </a:r>
+            <a:endParaRPr dirty="0"/>
           </a:p>
         </p:txBody>
       </p:sp>

</xml_diff>